<commit_message>
Updating repository: queries, formalization, reusability and thesis template
</commit_message>
<xml_diff>
--- a/Meetings/Query taxonomy (Venn diagrams).pptx
+++ b/Meetings/Query taxonomy (Venn diagrams).pptx
@@ -263,7 +263,7 @@
           <a:p>
             <a:fld id="{5EB6BBF5-0DAB-4A11-B454-40959D6B7F1B}" type="datetimeFigureOut">
               <a:rPr lang="fr-FR" smtClean="0"/>
-              <a:t>21/11/2016</a:t>
+              <a:t>24/11/2016</a:t>
             </a:fld>
             <a:endParaRPr lang="fr-FR"/>
           </a:p>
@@ -433,7 +433,7 @@
           <a:p>
             <a:fld id="{5EB6BBF5-0DAB-4A11-B454-40959D6B7F1B}" type="datetimeFigureOut">
               <a:rPr lang="fr-FR" smtClean="0"/>
-              <a:t>21/11/2016</a:t>
+              <a:t>24/11/2016</a:t>
             </a:fld>
             <a:endParaRPr lang="fr-FR"/>
           </a:p>
@@ -613,7 +613,7 @@
           <a:p>
             <a:fld id="{5EB6BBF5-0DAB-4A11-B454-40959D6B7F1B}" type="datetimeFigureOut">
               <a:rPr lang="fr-FR" smtClean="0"/>
-              <a:t>21/11/2016</a:t>
+              <a:t>24/11/2016</a:t>
             </a:fld>
             <a:endParaRPr lang="fr-FR"/>
           </a:p>
@@ -783,7 +783,7 @@
           <a:p>
             <a:fld id="{5EB6BBF5-0DAB-4A11-B454-40959D6B7F1B}" type="datetimeFigureOut">
               <a:rPr lang="fr-FR" smtClean="0"/>
-              <a:t>21/11/2016</a:t>
+              <a:t>24/11/2016</a:t>
             </a:fld>
             <a:endParaRPr lang="fr-FR"/>
           </a:p>
@@ -1029,7 +1029,7 @@
           <a:p>
             <a:fld id="{5EB6BBF5-0DAB-4A11-B454-40959D6B7F1B}" type="datetimeFigureOut">
               <a:rPr lang="fr-FR" smtClean="0"/>
-              <a:t>21/11/2016</a:t>
+              <a:t>24/11/2016</a:t>
             </a:fld>
             <a:endParaRPr lang="fr-FR"/>
           </a:p>
@@ -1261,7 +1261,7 @@
           <a:p>
             <a:fld id="{5EB6BBF5-0DAB-4A11-B454-40959D6B7F1B}" type="datetimeFigureOut">
               <a:rPr lang="fr-FR" smtClean="0"/>
-              <a:t>21/11/2016</a:t>
+              <a:t>24/11/2016</a:t>
             </a:fld>
             <a:endParaRPr lang="fr-FR"/>
           </a:p>
@@ -1628,7 +1628,7 @@
           <a:p>
             <a:fld id="{5EB6BBF5-0DAB-4A11-B454-40959D6B7F1B}" type="datetimeFigureOut">
               <a:rPr lang="fr-FR" smtClean="0"/>
-              <a:t>21/11/2016</a:t>
+              <a:t>24/11/2016</a:t>
             </a:fld>
             <a:endParaRPr lang="fr-FR"/>
           </a:p>
@@ -1746,7 +1746,7 @@
           <a:p>
             <a:fld id="{5EB6BBF5-0DAB-4A11-B454-40959D6B7F1B}" type="datetimeFigureOut">
               <a:rPr lang="fr-FR" smtClean="0"/>
-              <a:t>21/11/2016</a:t>
+              <a:t>24/11/2016</a:t>
             </a:fld>
             <a:endParaRPr lang="fr-FR"/>
           </a:p>
@@ -1841,7 +1841,7 @@
           <a:p>
             <a:fld id="{5EB6BBF5-0DAB-4A11-B454-40959D6B7F1B}" type="datetimeFigureOut">
               <a:rPr lang="fr-FR" smtClean="0"/>
-              <a:t>21/11/2016</a:t>
+              <a:t>24/11/2016</a:t>
             </a:fld>
             <a:endParaRPr lang="fr-FR"/>
           </a:p>
@@ -2118,7 +2118,7 @@
           <a:p>
             <a:fld id="{5EB6BBF5-0DAB-4A11-B454-40959D6B7F1B}" type="datetimeFigureOut">
               <a:rPr lang="fr-FR" smtClean="0"/>
-              <a:t>21/11/2016</a:t>
+              <a:t>24/11/2016</a:t>
             </a:fld>
             <a:endParaRPr lang="fr-FR"/>
           </a:p>
@@ -2371,7 +2371,7 @@
           <a:p>
             <a:fld id="{5EB6BBF5-0DAB-4A11-B454-40959D6B7F1B}" type="datetimeFigureOut">
               <a:rPr lang="fr-FR" smtClean="0"/>
-              <a:t>21/11/2016</a:t>
+              <a:t>24/11/2016</a:t>
             </a:fld>
             <a:endParaRPr lang="fr-FR"/>
           </a:p>
@@ -2584,7 +2584,7 @@
           <a:p>
             <a:fld id="{5EB6BBF5-0DAB-4A11-B454-40959D6B7F1B}" type="datetimeFigureOut">
               <a:rPr lang="fr-FR" smtClean="0"/>
-              <a:t>21/11/2016</a:t>
+              <a:t>24/11/2016</a:t>
             </a:fld>
             <a:endParaRPr lang="fr-FR"/>
           </a:p>
@@ -7010,11 +7010,7 @@
             <a:pPr algn="ctr"/>
             <a:r>
               <a:rPr lang="fr-FR" b="1" u="sng" dirty="0" smtClean="0"/>
-              <a:t>Query Subset (Case </a:t>
-            </a:r>
-            <a:r>
-              <a:rPr lang="fr-FR" b="1" u="sng" dirty="0" smtClean="0"/>
-              <a:t>11)</a:t>
+              <a:t>Query Subset (Case 11)</a:t>
             </a:r>
             <a:endParaRPr lang="fr-FR" b="1" u="sng" dirty="0"/>
           </a:p>
@@ -8318,11 +8314,7 @@
             <a:pPr algn="ctr"/>
             <a:r>
               <a:rPr lang="fr-FR" b="1" u="sng" dirty="0" smtClean="0"/>
-              <a:t>Query Subset (Case </a:t>
-            </a:r>
-            <a:r>
-              <a:rPr lang="fr-FR" b="1" u="sng" dirty="0" smtClean="0"/>
-              <a:t>12)</a:t>
+              <a:t>Query Subset (Case 12)</a:t>
             </a:r>
             <a:endParaRPr lang="fr-FR" b="1" u="sng" dirty="0"/>
           </a:p>
@@ -9677,45 +9669,13 @@
             </a:r>
             <a:r>
               <a:rPr lang="en-US" sz="1400" dirty="0" smtClean="0"/>
-              <a:t> (</a:t>
-            </a:r>
+              <a:t> (disease?; p_information!) :=  A1 (disease?; p!), A2 (p?; p_information!),</a:t>
+            </a:r>
+          </a:p>
+          <a:p>
             <a:r>
               <a:rPr lang="en-US" sz="1400" dirty="0" smtClean="0"/>
-              <a:t>disease?; p_information</a:t>
-            </a:r>
-            <a:r>
-              <a:rPr lang="en-US" sz="1400" dirty="0" smtClean="0"/>
-              <a:t>!) :=  A1 (disease?; p</a:t>
-            </a:r>
-            <a:r>
-              <a:rPr lang="en-US" sz="1400" dirty="0" smtClean="0"/>
-              <a:t>!), </a:t>
-            </a:r>
-            <a:r>
-              <a:rPr lang="en-US" sz="1400" dirty="0" smtClean="0"/>
-              <a:t>A2 (p?; </a:t>
-            </a:r>
-            <a:r>
-              <a:rPr lang="en-US" sz="1400" dirty="0" smtClean="0"/>
-              <a:t>p_information</a:t>
-            </a:r>
-            <a:r>
-              <a:rPr lang="en-US" sz="1400" dirty="0" smtClean="0"/>
-              <a:t>!),</a:t>
-            </a:r>
-          </a:p>
-          <a:p>
-            <a:r>
-              <a:rPr lang="en-US" sz="1400" dirty="0" smtClean="0"/>
-              <a:t>{availability &gt; </a:t>
-            </a:r>
-            <a:r>
-              <a:rPr lang="en-US" sz="1400" dirty="0" smtClean="0"/>
-              <a:t>97%, response time &lt; 3s, price </a:t>
-            </a:r>
-            <a:r>
-              <a:rPr lang="en-US" sz="1400" dirty="0" smtClean="0"/>
-              <a:t>per call &lt; 0.2$, provenance = certified, freshness = no, total response time &lt; 10s, total cost &lt; 5$}</a:t>
+              <a:t>{availability &gt; 97%, response time &lt; 3s, price per call &lt; 0.2$, provenance = certified, freshness = no, total response time &lt; 10s, total cost &lt; 5$}</a:t>
             </a:r>
             <a:endParaRPr lang="fr-FR" sz="1400" dirty="0"/>
           </a:p>
@@ -10900,39 +10860,7 @@
                   <a:schemeClr val="tx1"/>
                 </a:solidFill>
               </a:rPr>
-              <a:t>The second query is a subset of the first query in </a:t>
-            </a:r>
-            <a:r>
-              <a:rPr lang="en-US" dirty="0" smtClean="0">
-                <a:solidFill>
-                  <a:schemeClr val="tx1"/>
-                </a:solidFill>
-              </a:rPr>
-              <a:t>terms of the data which is retrieved. However, the quality of the data retrieved is </a:t>
-            </a:r>
-            <a:r>
-              <a:rPr lang="en-US" dirty="0" smtClean="0">
-                <a:solidFill>
-                  <a:schemeClr val="tx1"/>
-                </a:solidFill>
-              </a:rPr>
-              <a:t>equivalent considering </a:t>
-            </a:r>
-            <a:r>
-              <a:rPr lang="en-US" dirty="0" smtClean="0">
-                <a:solidFill>
-                  <a:schemeClr val="tx1"/>
-                </a:solidFill>
-              </a:rPr>
-              <a:t>that </a:t>
-            </a:r>
-            <a:r>
-              <a:rPr lang="en-US" dirty="0" smtClean="0">
-                <a:solidFill>
-                  <a:schemeClr val="tx1"/>
-                </a:solidFill>
-              </a:rPr>
-              <a:t>both queries have the same requirements. </a:t>
+              <a:t>The second query is a subset of the first query in terms of the data which is retrieved. However, the quality of the data retrieved is equivalent considering that both queries have the same requirements. </a:t>
             </a:r>
             <a:endParaRPr lang="en-US" dirty="0">
               <a:solidFill>
@@ -11117,31 +11045,7 @@
             </a:r>
             <a:r>
               <a:rPr lang="en-US" sz="1400" dirty="0" smtClean="0"/>
-              <a:t> (</a:t>
-            </a:r>
-            <a:r>
-              <a:rPr lang="en-US" sz="1400" dirty="0" smtClean="0"/>
-              <a:t>disease?; p_information</a:t>
-            </a:r>
-            <a:r>
-              <a:rPr lang="en-US" sz="1400" dirty="0" smtClean="0"/>
-              <a:t>!) :=  A1 (disease?; p</a:t>
-            </a:r>
-            <a:r>
-              <a:rPr lang="en-US" sz="1400" dirty="0" smtClean="0"/>
-              <a:t>!), </a:t>
-            </a:r>
-            <a:r>
-              <a:rPr lang="en-US" sz="1400" dirty="0" smtClean="0"/>
-              <a:t>A2 (p?; </a:t>
-            </a:r>
-            <a:r>
-              <a:rPr lang="en-US" sz="1400" dirty="0" smtClean="0"/>
-              <a:t>p_information</a:t>
-            </a:r>
-            <a:r>
-              <a:rPr lang="en-US" sz="1400" dirty="0" smtClean="0"/>
-              <a:t>!),</a:t>
+              <a:t> (disease?; p_information!) :=  A1 (disease?; p!), A2 (p?; p_information!),</a:t>
             </a:r>
           </a:p>
           <a:p>
@@ -11151,19 +11055,11 @@
             </a:r>
             <a:r>
               <a:rPr lang="en-US" sz="1400" b="1" dirty="0" smtClean="0"/>
-              <a:t>availability &gt; 98%, </a:t>
-            </a:r>
-            <a:r>
-              <a:rPr lang="en-US" sz="1400" b="1" dirty="0" smtClean="0"/>
-              <a:t>response time &lt; 2s</a:t>
+              <a:t>availability &gt; 98%, response time &lt; 2s</a:t>
             </a:r>
             <a:r>
               <a:rPr lang="en-US" sz="1400" dirty="0" smtClean="0"/>
-              <a:t>, price </a:t>
-            </a:r>
-            <a:r>
-              <a:rPr lang="en-US" sz="1400" dirty="0" smtClean="0"/>
-              <a:t>per call &lt; 0.2$, provenance = certified, freshness = no, total response time &lt; 10s, total cost &lt; 5$}</a:t>
+              <a:t>, price per call &lt; 0.2$, provenance = certified, freshness = no, total response time &lt; 10s, total cost &lt; 5$}</a:t>
             </a:r>
             <a:endParaRPr lang="fr-FR" sz="1400" dirty="0"/>
           </a:p>
@@ -12348,39 +12244,7 @@
                   <a:schemeClr val="tx1"/>
                 </a:solidFill>
               </a:rPr>
-              <a:t>The second query is a subset of the first query in </a:t>
-            </a:r>
-            <a:r>
-              <a:rPr lang="en-US" dirty="0" smtClean="0">
-                <a:solidFill>
-                  <a:schemeClr val="tx1"/>
-                </a:solidFill>
-              </a:rPr>
-              <a:t>terms of the data which is retrieved. However, the quality of the data retrieved </a:t>
-            </a:r>
-            <a:r>
-              <a:rPr lang="en-US" dirty="0" smtClean="0">
-                <a:solidFill>
-                  <a:schemeClr val="tx1"/>
-                </a:solidFill>
-              </a:rPr>
-              <a:t>in the second query is better considering </a:t>
-            </a:r>
-            <a:r>
-              <a:rPr lang="en-US" dirty="0" smtClean="0">
-                <a:solidFill>
-                  <a:schemeClr val="tx1"/>
-                </a:solidFill>
-              </a:rPr>
-              <a:t>that </a:t>
-            </a:r>
-            <a:r>
-              <a:rPr lang="en-US" dirty="0" smtClean="0">
-                <a:solidFill>
-                  <a:schemeClr val="tx1"/>
-                </a:solidFill>
-              </a:rPr>
-              <a:t>requirements in the second query are more restrict than in the first one (availability and response time). </a:t>
+              <a:t>The second query is a subset of the first query in terms of the data which is retrieved. However, the quality of the data retrieved in the second query is better considering that requirements in the second query are more restrict than in the first one (availability and response time). </a:t>
             </a:r>
             <a:endParaRPr lang="en-US" dirty="0">
               <a:solidFill>
@@ -12565,41 +12429,13 @@
             </a:r>
             <a:r>
               <a:rPr lang="en-US" sz="1400" dirty="0" smtClean="0"/>
-              <a:t> (</a:t>
-            </a:r>
+              <a:t> (disease?; p_information!) :=  A1 (disease?; p!), A2 (p?; p_information!),</a:t>
+            </a:r>
+          </a:p>
+          <a:p>
             <a:r>
               <a:rPr lang="en-US" sz="1400" dirty="0" smtClean="0"/>
-              <a:t>disease?; p_information</a:t>
-            </a:r>
-            <a:r>
-              <a:rPr lang="en-US" sz="1400" dirty="0" smtClean="0"/>
-              <a:t>!) :=  A1 (disease?; p</a:t>
-            </a:r>
-            <a:r>
-              <a:rPr lang="en-US" sz="1400" dirty="0" smtClean="0"/>
-              <a:t>!), </a:t>
-            </a:r>
-            <a:r>
-              <a:rPr lang="en-US" sz="1400" dirty="0" smtClean="0"/>
-              <a:t>A2 (p?; </a:t>
-            </a:r>
-            <a:r>
-              <a:rPr lang="en-US" sz="1400" dirty="0" smtClean="0"/>
-              <a:t>p_information</a:t>
-            </a:r>
-            <a:r>
-              <a:rPr lang="en-US" sz="1400" dirty="0" smtClean="0"/>
-              <a:t>!),</a:t>
-            </a:r>
-          </a:p>
-          <a:p>
-            <a:r>
-              <a:rPr lang="en-US" sz="1400" dirty="0" smtClean="0"/>
-              <a:t>{availability &gt; 98%, </a:t>
-            </a:r>
-            <a:r>
-              <a:rPr lang="en-US" sz="1400" dirty="0" smtClean="0"/>
-              <a:t>response time &lt; 2s, </a:t>
+              <a:t>{availability &gt; 98%, response time &lt; 2s, </a:t>
             </a:r>
             <a:r>
               <a:rPr lang="en-US" sz="1400" b="1" dirty="0" smtClean="0"/>
@@ -12615,11 +12451,7 @@
             </a:r>
             <a:r>
               <a:rPr lang="en-US" sz="1400" dirty="0" smtClean="0"/>
-              <a:t>price </a:t>
-            </a:r>
-            <a:r>
-              <a:rPr lang="en-US" sz="1400" dirty="0" smtClean="0"/>
-              <a:t>per call &lt; 0.2$, provenance = certified, freshness = no, total response time &lt; 10s, total cost &lt; 5$}</a:t>
+              <a:t>price per call &lt; 0.2$, provenance = certified, freshness = no, total response time &lt; 10s, total cost &lt; 5$}</a:t>
             </a:r>
             <a:endParaRPr lang="fr-FR" sz="1400" dirty="0"/>
           </a:p>
@@ -13804,39 +13636,7 @@
                   <a:schemeClr val="tx1"/>
                 </a:solidFill>
               </a:rPr>
-              <a:t>The second query is a subset of the first query in </a:t>
-            </a:r>
-            <a:r>
-              <a:rPr lang="en-US" dirty="0" smtClean="0">
-                <a:solidFill>
-                  <a:schemeClr val="tx1"/>
-                </a:solidFill>
-              </a:rPr>
-              <a:t>terms of the data which is retrieved. However, the quality of the data retrieved </a:t>
-            </a:r>
-            <a:r>
-              <a:rPr lang="en-US" dirty="0" smtClean="0">
-                <a:solidFill>
-                  <a:schemeClr val="tx1"/>
-                </a:solidFill>
-              </a:rPr>
-              <a:t>in the second query is better considering </a:t>
-            </a:r>
-            <a:r>
-              <a:rPr lang="en-US" dirty="0" smtClean="0">
-                <a:solidFill>
-                  <a:schemeClr val="tx1"/>
-                </a:solidFill>
-              </a:rPr>
-              <a:t>that </a:t>
-            </a:r>
-            <a:r>
-              <a:rPr lang="en-US" dirty="0" smtClean="0">
-                <a:solidFill>
-                  <a:schemeClr val="tx1"/>
-                </a:solidFill>
-              </a:rPr>
-              <a:t>requirements in the second query are more restrict than in the first one (the requirement data type adds new quality restrictions to the data collected that do not exists in the first query). </a:t>
+              <a:t>The second query is a subset of the first query in terms of the data which is retrieved. However, the quality of the data retrieved in the second query is better considering that requirements in the second query are more restrict than in the first one (the requirement data type adds new quality restrictions to the data collected that do not exists in the first query). </a:t>
             </a:r>
             <a:endParaRPr lang="en-US" dirty="0">
               <a:solidFill>
@@ -14021,41 +13821,13 @@
             </a:r>
             <a:r>
               <a:rPr lang="en-US" sz="1400" dirty="0" smtClean="0"/>
-              <a:t> (</a:t>
-            </a:r>
+              <a:t> (disease?; p_information!) :=  A1 (disease?; p!), A2 (p?; p_information!),</a:t>
+            </a:r>
+          </a:p>
+          <a:p>
             <a:r>
               <a:rPr lang="en-US" sz="1400" dirty="0" smtClean="0"/>
-              <a:t>disease?; p_information</a:t>
-            </a:r>
-            <a:r>
-              <a:rPr lang="en-US" sz="1400" dirty="0" smtClean="0"/>
-              <a:t>!) :=  A1 (disease?; p</a:t>
-            </a:r>
-            <a:r>
-              <a:rPr lang="en-US" sz="1400" dirty="0" smtClean="0"/>
-              <a:t>!), </a:t>
-            </a:r>
-            <a:r>
-              <a:rPr lang="en-US" sz="1400" dirty="0" smtClean="0"/>
-              <a:t>A2 (p?; </a:t>
-            </a:r>
-            <a:r>
-              <a:rPr lang="en-US" sz="1400" dirty="0" smtClean="0"/>
-              <a:t>p_information</a:t>
-            </a:r>
-            <a:r>
-              <a:rPr lang="en-US" sz="1400" dirty="0" smtClean="0"/>
-              <a:t>!),</a:t>
-            </a:r>
-          </a:p>
-          <a:p>
-            <a:r>
-              <a:rPr lang="en-US" sz="1400" dirty="0" smtClean="0"/>
-              <a:t>{availability &gt; </a:t>
-            </a:r>
-            <a:r>
-              <a:rPr lang="en-US" sz="1400" dirty="0" smtClean="0"/>
-              <a:t>97%, </a:t>
+              <a:t>{availability &gt; 97%, </a:t>
             </a:r>
             <a:r>
               <a:rPr lang="en-US" sz="1400" b="1" dirty="0" smtClean="0"/>
@@ -14063,11 +13835,7 @@
             </a:r>
             <a:r>
               <a:rPr lang="en-US" sz="1400" dirty="0" smtClean="0"/>
-              <a:t>price </a:t>
-            </a:r>
-            <a:r>
-              <a:rPr lang="en-US" sz="1400" dirty="0" smtClean="0"/>
-              <a:t>per call &lt; 0.2$, provenance = certified, freshness = no, total response time &lt; 10s, total cost &lt; 5$}</a:t>
+              <a:t>price per call &lt; 0.2$, provenance = certified, freshness = no, total response time &lt; 10s, total cost &lt; 5$}</a:t>
             </a:r>
             <a:endParaRPr lang="fr-FR" sz="1400" dirty="0"/>
           </a:p>
@@ -15252,39 +15020,7 @@
                   <a:schemeClr val="tx1"/>
                 </a:solidFill>
               </a:rPr>
-              <a:t>The second query is a subset of the first query in </a:t>
-            </a:r>
-            <a:r>
-              <a:rPr lang="en-US" dirty="0" smtClean="0">
-                <a:solidFill>
-                  <a:schemeClr val="tx1"/>
-                </a:solidFill>
-              </a:rPr>
-              <a:t>terms of the data which is retrieved. However, the quality of the data retrieved </a:t>
-            </a:r>
-            <a:r>
-              <a:rPr lang="en-US" dirty="0" smtClean="0">
-                <a:solidFill>
-                  <a:schemeClr val="tx1"/>
-                </a:solidFill>
-              </a:rPr>
-              <a:t>in the second query is lower considering </a:t>
-            </a:r>
-            <a:r>
-              <a:rPr lang="en-US" dirty="0" smtClean="0">
-                <a:solidFill>
-                  <a:schemeClr val="tx1"/>
-                </a:solidFill>
-              </a:rPr>
-              <a:t>that </a:t>
-            </a:r>
-            <a:r>
-              <a:rPr lang="en-US" dirty="0" smtClean="0">
-                <a:solidFill>
-                  <a:schemeClr val="tx1"/>
-                </a:solidFill>
-              </a:rPr>
-              <a:t>requirements in the second query are less restrict than in the first one (response time). </a:t>
+              <a:t>The second query is a subset of the first query in terms of the data which is retrieved. However, the quality of the data retrieved in the second query is lower considering that requirements in the second query are less restrict than in the first one (response time). </a:t>
             </a:r>
             <a:endParaRPr lang="en-US" dirty="0">
               <a:solidFill>
@@ -15469,45 +15205,13 @@
             </a:r>
             <a:r>
               <a:rPr lang="en-US" sz="1400" dirty="0" smtClean="0"/>
-              <a:t> (</a:t>
-            </a:r>
+              <a:t> (disease?; p_information!) :=  A1 (disease?; p!), A2 (p?; p_information!),</a:t>
+            </a:r>
+          </a:p>
+          <a:p>
             <a:r>
               <a:rPr lang="en-US" sz="1400" dirty="0" smtClean="0"/>
-              <a:t>disease?; p_information</a:t>
-            </a:r>
-            <a:r>
-              <a:rPr lang="en-US" sz="1400" dirty="0" smtClean="0"/>
-              <a:t>!) :=  A1 (disease?; p</a:t>
-            </a:r>
-            <a:r>
-              <a:rPr lang="en-US" sz="1400" dirty="0" smtClean="0"/>
-              <a:t>!), </a:t>
-            </a:r>
-            <a:r>
-              <a:rPr lang="en-US" sz="1400" dirty="0" smtClean="0"/>
-              <a:t>A2 (p?; </a:t>
-            </a:r>
-            <a:r>
-              <a:rPr lang="en-US" sz="1400" dirty="0" smtClean="0"/>
-              <a:t>p_information</a:t>
-            </a:r>
-            <a:r>
-              <a:rPr lang="en-US" sz="1400" dirty="0" smtClean="0"/>
-              <a:t>!),</a:t>
-            </a:r>
-          </a:p>
-          <a:p>
-            <a:r>
-              <a:rPr lang="en-US" sz="1400" dirty="0" smtClean="0"/>
-              <a:t>{availability &gt; </a:t>
-            </a:r>
-            <a:r>
-              <a:rPr lang="en-US" sz="1400" dirty="0" smtClean="0"/>
-              <a:t>97%, price </a:t>
-            </a:r>
-            <a:r>
-              <a:rPr lang="en-US" sz="1400" dirty="0" smtClean="0"/>
-              <a:t>per call &lt; 0.2$, provenance = certified, freshness = no, total response time &lt; 10s, total cost &lt; 5$}</a:t>
+              <a:t>{availability &gt; 97%, price per call &lt; 0.2$, provenance = certified, freshness = no, total response time &lt; 10s, total cost &lt; 5$}</a:t>
             </a:r>
             <a:endParaRPr lang="fr-FR" sz="1400" dirty="0"/>
           </a:p>
@@ -16692,39 +16396,7 @@
                   <a:schemeClr val="tx1"/>
                 </a:solidFill>
               </a:rPr>
-              <a:t>The second query is a subset of the first query in </a:t>
-            </a:r>
-            <a:r>
-              <a:rPr lang="en-US" dirty="0" smtClean="0">
-                <a:solidFill>
-                  <a:schemeClr val="tx1"/>
-                </a:solidFill>
-              </a:rPr>
-              <a:t>terms of the data which is retrieved. However, the quality of the data retrieved </a:t>
-            </a:r>
-            <a:r>
-              <a:rPr lang="en-US" dirty="0" smtClean="0">
-                <a:solidFill>
-                  <a:schemeClr val="tx1"/>
-                </a:solidFill>
-              </a:rPr>
-              <a:t>in the second query is lower considering </a:t>
-            </a:r>
-            <a:r>
-              <a:rPr lang="en-US" dirty="0" smtClean="0">
-                <a:solidFill>
-                  <a:schemeClr val="tx1"/>
-                </a:solidFill>
-              </a:rPr>
-              <a:t>that </a:t>
-            </a:r>
-            <a:r>
-              <a:rPr lang="en-US" dirty="0" smtClean="0">
-                <a:solidFill>
-                  <a:schemeClr val="tx1"/>
-                </a:solidFill>
-              </a:rPr>
-              <a:t>requirements in the second query are less restrict than in the first one (the absence of the response time requirements makes the requirements of the second set query as less restrict than the requirements of the first query). </a:t>
+              <a:t>The second query is a subset of the first query in terms of the data which is retrieved. However, the quality of the data retrieved in the second query is lower considering that requirements in the second query are less restrict than in the first one (the absence of the response time requirements makes the requirements of the second set query as less restrict than the requirements of the first query). </a:t>
             </a:r>
             <a:endParaRPr lang="en-US" dirty="0">
               <a:solidFill>
@@ -17607,31 +17279,7 @@
             </a:r>
             <a:r>
               <a:rPr lang="en-US" sz="1400" dirty="0" smtClean="0"/>
-              <a:t> (</a:t>
-            </a:r>
-            <a:r>
-              <a:rPr lang="en-US" sz="1400" dirty="0" smtClean="0"/>
-              <a:t>disease?; p_information</a:t>
-            </a:r>
-            <a:r>
-              <a:rPr lang="en-US" sz="1400" dirty="0" smtClean="0"/>
-              <a:t>!) :=  A1 (disease?; p</a:t>
-            </a:r>
-            <a:r>
-              <a:rPr lang="en-US" sz="1400" dirty="0" smtClean="0"/>
-              <a:t>!), </a:t>
-            </a:r>
-            <a:r>
-              <a:rPr lang="en-US" sz="1400" dirty="0" smtClean="0"/>
-              <a:t>A2 (p?; </a:t>
-            </a:r>
-            <a:r>
-              <a:rPr lang="en-US" sz="1400" dirty="0" smtClean="0"/>
-              <a:t>p_information</a:t>
-            </a:r>
-            <a:r>
-              <a:rPr lang="en-US" sz="1400" dirty="0" smtClean="0"/>
-              <a:t>!),</a:t>
+              <a:t> (disease?; p_information!) :=  A1 (disease?; p!), A2 (p?; p_information!),</a:t>
             </a:r>
           </a:p>
           <a:p>
@@ -17641,19 +17289,11 @@
             </a:r>
             <a:r>
               <a:rPr lang="en-US" sz="1400" b="1" dirty="0" smtClean="0"/>
-              <a:t>availability &gt; </a:t>
-            </a:r>
-            <a:r>
-              <a:rPr lang="en-US" sz="1400" b="1" dirty="0" smtClean="0"/>
-              <a:t>98%, </a:t>
+              <a:t>availability &gt; 98%, </a:t>
             </a:r>
             <a:r>
               <a:rPr lang="en-US" sz="1400" dirty="0" smtClean="0"/>
-              <a:t>price </a:t>
-            </a:r>
-            <a:r>
-              <a:rPr lang="en-US" sz="1400" dirty="0" smtClean="0"/>
-              <a:t>per call &lt; 0.2$, provenance = certified, freshness = no, total response time &lt; 10s, total cost &lt; 5$}</a:t>
+              <a:t>price per call &lt; 0.2$, provenance = certified, freshness = no, total response time &lt; 10s, total cost &lt; 5$}</a:t>
             </a:r>
             <a:endParaRPr lang="fr-FR" sz="1400" dirty="0"/>
           </a:p>
@@ -18838,39 +18478,7 @@
                   <a:schemeClr val="tx1"/>
                 </a:solidFill>
               </a:rPr>
-              <a:t>The second query is a subset of the first query in </a:t>
-            </a:r>
-            <a:r>
-              <a:rPr lang="en-US" dirty="0" smtClean="0">
-                <a:solidFill>
-                  <a:schemeClr val="tx1"/>
-                </a:solidFill>
-              </a:rPr>
-              <a:t>terms of the data which is retrieved. However, the quality of the data retrieved </a:t>
-            </a:r>
-            <a:r>
-              <a:rPr lang="en-US" dirty="0" smtClean="0">
-                <a:solidFill>
-                  <a:schemeClr val="tx1"/>
-                </a:solidFill>
-              </a:rPr>
-              <a:t>is different considering </a:t>
-            </a:r>
-            <a:r>
-              <a:rPr lang="en-US" dirty="0" smtClean="0">
-                <a:solidFill>
-                  <a:schemeClr val="tx1"/>
-                </a:solidFill>
-              </a:rPr>
-              <a:t>that </a:t>
-            </a:r>
-            <a:r>
-              <a:rPr lang="en-US" dirty="0" smtClean="0">
-                <a:solidFill>
-                  <a:schemeClr val="tx1"/>
-                </a:solidFill>
-              </a:rPr>
-              <a:t>there are requirements more restrict (availability) and requirements less restrict (the absence of the response time requirements makes the requirements of the second set query as less restrict than the requirements of the first </a:t>
+              <a:t>The second query is a subset of the first query in terms of the data which is retrieved. However, the quality of the data retrieved is different considering that there are requirements more restrict (availability) and requirements less restrict (the absence of the response time requirements makes the requirements of the second set query as less restrict than the requirements of the first </a:t>
             </a:r>
             <a:r>
               <a:rPr lang="en-US" dirty="0">
@@ -19071,61 +18679,13 @@
             </a:r>
             <a:r>
               <a:rPr lang="en-US" sz="1400" dirty="0" smtClean="0"/>
-              <a:t> (</a:t>
-            </a:r>
+              <a:t> (disease?; p_information!) :=  A3 (doctor?; p!), A2 (p?; p_information!),</a:t>
+            </a:r>
+          </a:p>
+          <a:p>
             <a:r>
               <a:rPr lang="en-US" sz="1400" dirty="0" smtClean="0"/>
-              <a:t>disease?; p_information</a:t>
-            </a:r>
-            <a:r>
-              <a:rPr lang="en-US" sz="1400" dirty="0" smtClean="0"/>
-              <a:t>!) :=  </a:t>
-            </a:r>
-            <a:r>
-              <a:rPr lang="en-US" sz="1400" dirty="0" smtClean="0"/>
-              <a:t>A3 </a:t>
-            </a:r>
-            <a:r>
-              <a:rPr lang="en-US" sz="1400" dirty="0" smtClean="0"/>
-              <a:t>(</a:t>
-            </a:r>
-            <a:r>
-              <a:rPr lang="en-US" sz="1400" dirty="0" smtClean="0"/>
-              <a:t>doctor?; </a:t>
-            </a:r>
-            <a:r>
-              <a:rPr lang="en-US" sz="1400" dirty="0" smtClean="0"/>
-              <a:t>p</a:t>
-            </a:r>
-            <a:r>
-              <a:rPr lang="en-US" sz="1400" dirty="0" smtClean="0"/>
-              <a:t>!), </a:t>
-            </a:r>
-            <a:r>
-              <a:rPr lang="en-US" sz="1400" dirty="0" smtClean="0"/>
-              <a:t>A2 (p?; </a:t>
-            </a:r>
-            <a:r>
-              <a:rPr lang="en-US" sz="1400" dirty="0" smtClean="0"/>
-              <a:t>p_information</a:t>
-            </a:r>
-            <a:r>
-              <a:rPr lang="en-US" sz="1400" dirty="0" smtClean="0"/>
-              <a:t>!),</a:t>
-            </a:r>
-          </a:p>
-          <a:p>
-            <a:r>
-              <a:rPr lang="en-US" sz="1400" dirty="0" smtClean="0"/>
-              <a:t>{availability &gt; </a:t>
-            </a:r>
-            <a:r>
-              <a:rPr lang="en-US" sz="1400" dirty="0" smtClean="0"/>
-              <a:t>97%, response time &lt; 3s, price </a:t>
-            </a:r>
-            <a:r>
-              <a:rPr lang="en-US" sz="1400" dirty="0" smtClean="0"/>
-              <a:t>per call &lt; 0.2$, provenance = certified, freshness = no, total response time &lt; 10s, total cost &lt; 5$}</a:t>
+              <a:t>{availability &gt; 97%, response time &lt; 3s, price per call &lt; 0.2$, provenance = certified, freshness = no, total response time &lt; 10s, total cost &lt; 5$}</a:t>
             </a:r>
             <a:endParaRPr lang="fr-FR" sz="1400" dirty="0"/>
           </a:p>
@@ -19747,7 +19307,15 @@
             </a:r>
             <a:r>
               <a:rPr lang="en-US" sz="1400" dirty="0" smtClean="0"/>
-              <a:t> (disease?, doctor?; p_information!) :=  A1 (disease?; p!), A3 (doctor?; p!), A2 (p?; p_information!),</a:t>
+              <a:t> (disease?, doctor?; p_information!) :=  A1 (disease?; p</a:t>
+            </a:r>
+            <a:r>
+              <a:rPr lang="en-US" sz="1400" dirty="0" smtClean="0"/>
+              <a:t>!), </a:t>
+            </a:r>
+            <a:r>
+              <a:rPr lang="en-US" sz="1400" dirty="0" smtClean="0"/>
+              <a:t>A2 (p?; p_information!),</a:t>
             </a:r>
           </a:p>
           <a:p>
@@ -19812,31 +19380,7 @@
                   <a:schemeClr val="tx1"/>
                 </a:solidFill>
               </a:rPr>
-              <a:t>The queries are different in </a:t>
-            </a:r>
-            <a:r>
-              <a:rPr lang="en-US" dirty="0" smtClean="0">
-                <a:solidFill>
-                  <a:schemeClr val="tx1"/>
-                </a:solidFill>
-              </a:rPr>
-              <a:t>terms of the data which is retrieved. However, the quality of the data retrieved </a:t>
-            </a:r>
-            <a:r>
-              <a:rPr lang="en-US" dirty="0" smtClean="0">
-                <a:solidFill>
-                  <a:schemeClr val="tx1"/>
-                </a:solidFill>
-              </a:rPr>
-              <a:t>is equivalent</a:t>
-            </a:r>
-            <a:r>
-              <a:rPr lang="en-US" dirty="0" smtClean="0">
-                <a:solidFill>
-                  <a:schemeClr val="tx1"/>
-                </a:solidFill>
-              </a:rPr>
-              <a:t>. </a:t>
+              <a:t>The queries are different in terms of the data which is retrieved. However, the quality of the data retrieved is equivalent. </a:t>
             </a:r>
             <a:endParaRPr lang="en-US" dirty="0">
               <a:solidFill>
@@ -24411,7 +23955,7 @@
       </p:grpSp>
       <p:grpSp>
         <p:nvGrpSpPr>
-          <p:cNvPr id="36" name="Grupo 35"/>
+          <p:cNvPr id="38" name="Grupo 37"/>
           <p:cNvGrpSpPr/>
           <p:nvPr/>
         </p:nvGrpSpPr>
@@ -24419,140 +23963,79 @@
           <a:xfrm>
             <a:off x="7383381" y="2005930"/>
             <a:ext cx="3619500" cy="3332077"/>
-            <a:chOff x="7419475" y="1969814"/>
+            <a:chOff x="1066800" y="3413626"/>
             <a:chExt cx="3619500" cy="3332077"/>
           </a:xfrm>
         </p:grpSpPr>
         <p:grpSp>
           <p:nvGrpSpPr>
-            <p:cNvPr id="38" name="Grupo 37"/>
+            <p:cNvPr id="45" name="Grupo 44"/>
             <p:cNvGrpSpPr/>
             <p:nvPr/>
           </p:nvGrpSpPr>
           <p:grpSpPr>
             <a:xfrm>
-              <a:off x="7419475" y="1969814"/>
-              <a:ext cx="3619500" cy="3332077"/>
-              <a:chOff x="1066800" y="3413626"/>
-              <a:chExt cx="3619500" cy="3332077"/>
+              <a:off x="1066800" y="3413626"/>
+              <a:ext cx="3619500" cy="2514600"/>
+              <a:chOff x="1066800" y="3401594"/>
+              <a:chExt cx="3619500" cy="2514600"/>
             </a:xfrm>
           </p:grpSpPr>
-          <p:grpSp>
-            <p:nvGrpSpPr>
-              <p:cNvPr id="45" name="Grupo 44"/>
-              <p:cNvGrpSpPr/>
-              <p:nvPr/>
-            </p:nvGrpSpPr>
-            <p:grpSpPr>
-              <a:xfrm>
-                <a:off x="1066800" y="3413626"/>
-                <a:ext cx="3619500" cy="2514600"/>
-                <a:chOff x="1066800" y="3401594"/>
-                <a:chExt cx="3619500" cy="2514600"/>
-              </a:xfrm>
-            </p:grpSpPr>
-            <p:sp>
-              <p:nvSpPr>
-                <p:cNvPr id="47" name="Elipse 46"/>
-                <p:cNvSpPr/>
-                <p:nvPr/>
-              </p:nvSpPr>
-              <p:spPr>
-                <a:xfrm>
-                  <a:off x="1066800" y="3401594"/>
-                  <a:ext cx="2514600" cy="2514600"/>
-                </a:xfrm>
-                <a:prstGeom prst="ellipse">
-                  <a:avLst/>
-                </a:prstGeom>
-                <a:noFill/>
-                <a:ln>
-                  <a:solidFill>
-                    <a:schemeClr val="tx1"/>
-                  </a:solidFill>
-                </a:ln>
-              </p:spPr>
-              <p:style>
-                <a:lnRef idx="2">
-                  <a:schemeClr val="accent1">
-                    <a:shade val="50000"/>
-                  </a:schemeClr>
-                </a:lnRef>
-                <a:fillRef idx="1">
-                  <a:schemeClr val="accent1"/>
-                </a:fillRef>
-                <a:effectRef idx="0">
-                  <a:schemeClr val="accent1"/>
-                </a:effectRef>
-                <a:fontRef idx="minor">
-                  <a:schemeClr val="lt1"/>
-                </a:fontRef>
-              </p:style>
-              <p:txBody>
-                <a:bodyPr rtlCol="0" anchor="ctr"/>
-                <a:lstStyle/>
-                <a:p>
-                  <a:pPr algn="ctr"/>
-                  <a:endParaRPr lang="fr-FR"/>
-                </a:p>
-              </p:txBody>
-            </p:sp>
-            <p:sp>
-              <p:nvSpPr>
-                <p:cNvPr id="48" name="Elipse 47"/>
-                <p:cNvSpPr/>
-                <p:nvPr/>
-              </p:nvSpPr>
-              <p:spPr>
-                <a:xfrm>
-                  <a:off x="2171700" y="3401594"/>
-                  <a:ext cx="2514600" cy="2514600"/>
-                </a:xfrm>
-                <a:prstGeom prst="ellipse">
-                  <a:avLst/>
-                </a:prstGeom>
-                <a:noFill/>
-                <a:ln>
-                  <a:solidFill>
-                    <a:schemeClr val="tx1"/>
-                  </a:solidFill>
-                </a:ln>
-              </p:spPr>
-              <p:style>
-                <a:lnRef idx="2">
-                  <a:schemeClr val="accent1">
-                    <a:shade val="50000"/>
-                  </a:schemeClr>
-                </a:lnRef>
-                <a:fillRef idx="1">
-                  <a:schemeClr val="accent1"/>
-                </a:fillRef>
-                <a:effectRef idx="0">
-                  <a:schemeClr val="accent1"/>
-                </a:effectRef>
-                <a:fontRef idx="minor">
-                  <a:schemeClr val="lt1"/>
-                </a:fontRef>
-              </p:style>
-              <p:txBody>
-                <a:bodyPr rtlCol="0" anchor="ctr"/>
-                <a:lstStyle/>
-                <a:p>
-                  <a:pPr algn="ctr"/>
-                  <a:endParaRPr lang="fr-FR"/>
-                </a:p>
-              </p:txBody>
-            </p:sp>
-          </p:grpSp>
           <p:sp>
             <p:nvSpPr>
-              <p:cNvPr id="46" name="Elipse 45"/>
+              <p:cNvPr id="47" name="Elipse 46"/>
               <p:cNvSpPr/>
               <p:nvPr/>
             </p:nvSpPr>
             <p:spPr>
               <a:xfrm>
-                <a:off x="1631282" y="4231103"/>
+                <a:off x="1066800" y="3401594"/>
+                <a:ext cx="2514600" cy="2514600"/>
+              </a:xfrm>
+              <a:prstGeom prst="ellipse">
+                <a:avLst/>
+              </a:prstGeom>
+              <a:noFill/>
+              <a:ln>
+                <a:solidFill>
+                  <a:schemeClr val="tx1"/>
+                </a:solidFill>
+              </a:ln>
+            </p:spPr>
+            <p:style>
+              <a:lnRef idx="2">
+                <a:schemeClr val="accent1">
+                  <a:shade val="50000"/>
+                </a:schemeClr>
+              </a:lnRef>
+              <a:fillRef idx="1">
+                <a:schemeClr val="accent1"/>
+              </a:fillRef>
+              <a:effectRef idx="0">
+                <a:schemeClr val="accent1"/>
+              </a:effectRef>
+              <a:fontRef idx="minor">
+                <a:schemeClr val="lt1"/>
+              </a:fontRef>
+            </p:style>
+            <p:txBody>
+              <a:bodyPr rtlCol="0" anchor="ctr"/>
+              <a:lstStyle/>
+              <a:p>
+                <a:pPr algn="ctr"/>
+                <a:endParaRPr lang="fr-FR"/>
+              </a:p>
+            </p:txBody>
+          </p:sp>
+          <p:sp>
+            <p:nvSpPr>
+              <p:cNvPr id="48" name="Elipse 47"/>
+              <p:cNvSpPr/>
+              <p:nvPr/>
+            </p:nvSpPr>
+            <p:spPr>
+              <a:xfrm>
+                <a:off x="2171700" y="3401594"/>
                 <a:ext cx="2514600" cy="2514600"/>
               </a:xfrm>
               <a:prstGeom prst="ellipse">
@@ -24591,344 +24074,320 @@
             </p:txBody>
           </p:sp>
         </p:grpSp>
-        <p:cxnSp>
-          <p:nvCxnSpPr>
-            <p:cNvPr id="49" name="Conector reto 48"/>
-            <p:cNvCxnSpPr/>
+        <p:sp>
+          <p:nvSpPr>
+            <p:cNvPr id="46" name="Elipse 45"/>
+            <p:cNvSpPr/>
             <p:nvPr/>
-          </p:nvCxnSpPr>
+          </p:nvSpPr>
           <p:spPr>
-            <a:xfrm flipV="1">
-              <a:off x="8556766" y="2806227"/>
-              <a:ext cx="882822" cy="665280"/>
+            <a:xfrm>
+              <a:off x="1631282" y="4231103"/>
+              <a:ext cx="2514600" cy="2514600"/>
             </a:xfrm>
-            <a:prstGeom prst="line">
+            <a:prstGeom prst="ellipse">
               <a:avLst/>
             </a:prstGeom>
-            <a:ln w="9525">
+            <a:noFill/>
+            <a:ln>
               <a:solidFill>
-                <a:srgbClr val="FF0000"/>
+                <a:schemeClr val="tx1"/>
               </a:solidFill>
             </a:ln>
           </p:spPr>
           <p:style>
-            <a:lnRef idx="1">
-              <a:schemeClr val="accent1"/>
+            <a:lnRef idx="2">
+              <a:schemeClr val="accent1">
+                <a:shade val="50000"/>
+              </a:schemeClr>
             </a:lnRef>
-            <a:fillRef idx="0">
+            <a:fillRef idx="1">
               <a:schemeClr val="accent1"/>
             </a:fillRef>
             <a:effectRef idx="0">
               <a:schemeClr val="accent1"/>
             </a:effectRef>
             <a:fontRef idx="minor">
-              <a:schemeClr val="tx1"/>
+              <a:schemeClr val="lt1"/>
             </a:fontRef>
           </p:style>
-        </p:cxnSp>
-        <p:cxnSp>
-          <p:nvCxnSpPr>
-            <p:cNvPr id="50" name="Conector reto 49"/>
-            <p:cNvCxnSpPr/>
-            <p:nvPr/>
-          </p:nvCxnSpPr>
-          <p:spPr>
-            <a:xfrm flipV="1">
-              <a:off x="8606862" y="2872586"/>
-              <a:ext cx="1099302" cy="828418"/>
-            </a:xfrm>
-            <a:prstGeom prst="line">
-              <a:avLst/>
-            </a:prstGeom>
-            <a:ln w="9525">
-              <a:solidFill>
-                <a:srgbClr val="FF0000"/>
-              </a:solidFill>
-            </a:ln>
-          </p:spPr>
-          <p:style>
-            <a:lnRef idx="1">
-              <a:schemeClr val="accent1"/>
-            </a:lnRef>
-            <a:fillRef idx="0">
-              <a:schemeClr val="accent1"/>
-            </a:fillRef>
-            <a:effectRef idx="0">
-              <a:schemeClr val="accent1"/>
-            </a:effectRef>
-            <a:fontRef idx="minor">
-              <a:schemeClr val="tx1"/>
-            </a:fontRef>
-          </p:style>
-        </p:cxnSp>
-        <p:cxnSp>
-          <p:nvCxnSpPr>
-            <p:cNvPr id="51" name="Conector reto 50"/>
-            <p:cNvCxnSpPr/>
-            <p:nvPr/>
-          </p:nvCxnSpPr>
-          <p:spPr>
-            <a:xfrm flipV="1">
-              <a:off x="8723547" y="2994542"/>
-              <a:ext cx="1175417" cy="885774"/>
-            </a:xfrm>
-            <a:prstGeom prst="line">
-              <a:avLst/>
-            </a:prstGeom>
-            <a:ln w="9525">
-              <a:solidFill>
-                <a:srgbClr val="FF0000"/>
-              </a:solidFill>
-            </a:ln>
-          </p:spPr>
-          <p:style>
-            <a:lnRef idx="1">
-              <a:schemeClr val="accent1"/>
-            </a:lnRef>
-            <a:fillRef idx="0">
-              <a:schemeClr val="accent1"/>
-            </a:fillRef>
-            <a:effectRef idx="0">
-              <a:schemeClr val="accent1"/>
-            </a:effectRef>
-            <a:fontRef idx="minor">
-              <a:schemeClr val="tx1"/>
-            </a:fontRef>
-          </p:style>
-        </p:cxnSp>
-        <p:cxnSp>
-          <p:nvCxnSpPr>
-            <p:cNvPr id="53" name="Conector reto 52"/>
-            <p:cNvCxnSpPr>
-              <a:endCxn id="47" idx="6"/>
-            </p:cNvCxnSpPr>
-            <p:nvPr/>
-          </p:nvCxnSpPr>
-          <p:spPr>
-            <a:xfrm flipV="1">
-              <a:off x="8847049" y="3227114"/>
-              <a:ext cx="1087026" cy="840860"/>
-            </a:xfrm>
-            <a:prstGeom prst="line">
-              <a:avLst/>
-            </a:prstGeom>
-            <a:ln w="9525">
-              <a:solidFill>
-                <a:srgbClr val="FF0000"/>
-              </a:solidFill>
-            </a:ln>
-          </p:spPr>
-          <p:style>
-            <a:lnRef idx="1">
-              <a:schemeClr val="accent1"/>
-            </a:lnRef>
-            <a:fillRef idx="0">
-              <a:schemeClr val="accent1"/>
-            </a:fillRef>
-            <a:effectRef idx="0">
-              <a:schemeClr val="accent1"/>
-            </a:effectRef>
-            <a:fontRef idx="minor">
-              <a:schemeClr val="tx1"/>
-            </a:fontRef>
-          </p:style>
-        </p:cxnSp>
-        <p:cxnSp>
-          <p:nvCxnSpPr>
-            <p:cNvPr id="54" name="Conector reto 53"/>
-            <p:cNvCxnSpPr/>
-            <p:nvPr/>
-          </p:nvCxnSpPr>
-          <p:spPr>
-            <a:xfrm flipV="1">
-              <a:off x="9000251" y="3525871"/>
-              <a:ext cx="902909" cy="680419"/>
-            </a:xfrm>
-            <a:prstGeom prst="line">
-              <a:avLst/>
-            </a:prstGeom>
-            <a:ln w="9525">
-              <a:solidFill>
-                <a:srgbClr val="FF0000"/>
-              </a:solidFill>
-            </a:ln>
-          </p:spPr>
-          <p:style>
-            <a:lnRef idx="1">
-              <a:schemeClr val="accent1"/>
-            </a:lnRef>
-            <a:fillRef idx="0">
-              <a:schemeClr val="accent1"/>
-            </a:fillRef>
-            <a:effectRef idx="0">
-              <a:schemeClr val="accent1"/>
-            </a:effectRef>
-            <a:fontRef idx="minor">
-              <a:schemeClr val="tx1"/>
-            </a:fontRef>
-          </p:style>
-        </p:cxnSp>
-        <p:cxnSp>
-          <p:nvCxnSpPr>
-            <p:cNvPr id="55" name="Conector reto 54"/>
-            <p:cNvCxnSpPr/>
-            <p:nvPr/>
-          </p:nvCxnSpPr>
-          <p:spPr>
-            <a:xfrm flipV="1">
-              <a:off x="9193050" y="3933574"/>
-              <a:ext cx="523725" cy="394672"/>
-            </a:xfrm>
-            <a:prstGeom prst="line">
-              <a:avLst/>
-            </a:prstGeom>
-            <a:ln w="9525">
-              <a:solidFill>
-                <a:srgbClr val="FF0000"/>
-              </a:solidFill>
-            </a:ln>
-          </p:spPr>
-          <p:style>
-            <a:lnRef idx="1">
-              <a:schemeClr val="accent1"/>
-            </a:lnRef>
-            <a:fillRef idx="0">
-              <a:schemeClr val="accent1"/>
-            </a:fillRef>
-            <a:effectRef idx="0">
-              <a:schemeClr val="accent1"/>
-            </a:effectRef>
-            <a:fontRef idx="minor">
-              <a:schemeClr val="tx1"/>
-            </a:fontRef>
-          </p:style>
-        </p:cxnSp>
-        <p:cxnSp>
-          <p:nvCxnSpPr>
-            <p:cNvPr id="56" name="Conector reto 55"/>
-            <p:cNvCxnSpPr/>
-            <p:nvPr/>
-          </p:nvCxnSpPr>
-          <p:spPr>
-            <a:xfrm flipV="1">
-              <a:off x="8534553" y="2806504"/>
-              <a:ext cx="519210" cy="391268"/>
-            </a:xfrm>
-            <a:prstGeom prst="line">
-              <a:avLst/>
-            </a:prstGeom>
-            <a:ln w="9525">
-              <a:solidFill>
-                <a:srgbClr val="FF0000"/>
-              </a:solidFill>
-            </a:ln>
-          </p:spPr>
-          <p:style>
-            <a:lnRef idx="1">
-              <a:schemeClr val="accent1"/>
-            </a:lnRef>
-            <a:fillRef idx="0">
-              <a:schemeClr val="accent1"/>
-            </a:fillRef>
-            <a:effectRef idx="0">
-              <a:schemeClr val="accent1"/>
-            </a:effectRef>
-            <a:fontRef idx="minor">
-              <a:schemeClr val="tx1"/>
-            </a:fontRef>
-          </p:style>
-        </p:cxnSp>
-        <p:sp>
-          <p:nvSpPr>
-            <p:cNvPr id="59" name="CaixaDeTexto 58"/>
-            <p:cNvSpPr txBox="1"/>
-            <p:nvPr/>
-          </p:nvSpPr>
-          <p:spPr>
-            <a:xfrm>
-              <a:off x="7943864" y="2795308"/>
-              <a:ext cx="434734" cy="369332"/>
-            </a:xfrm>
-            <a:prstGeom prst="rect">
-              <a:avLst/>
-            </a:prstGeom>
-            <a:noFill/>
-          </p:spPr>
           <p:txBody>
-            <a:bodyPr wrap="none" rtlCol="0">
-              <a:spAutoFit/>
-            </a:bodyPr>
+            <a:bodyPr rtlCol="0" anchor="ctr"/>
             <a:lstStyle/>
             <a:p>
-              <a:r>
-                <a:rPr lang="fr-FR" dirty="0" smtClean="0"/>
-                <a:t>A1</a:t>
-              </a:r>
-              <a:endParaRPr lang="fr-FR" dirty="0"/>
-            </a:p>
-          </p:txBody>
-        </p:sp>
-        <p:sp>
-          <p:nvSpPr>
-            <p:cNvPr id="60" name="CaixaDeTexto 59"/>
-            <p:cNvSpPr txBox="1"/>
-            <p:nvPr/>
-          </p:nvSpPr>
-          <p:spPr>
-            <a:xfrm>
-              <a:off x="10106217" y="2713539"/>
-              <a:ext cx="434734" cy="369332"/>
-            </a:xfrm>
-            <a:prstGeom prst="rect">
-              <a:avLst/>
-            </a:prstGeom>
-            <a:noFill/>
-          </p:spPr>
-          <p:txBody>
-            <a:bodyPr wrap="none" rtlCol="0">
-              <a:spAutoFit/>
-            </a:bodyPr>
-            <a:lstStyle/>
-            <a:p>
-              <a:r>
-                <a:rPr lang="fr-FR" dirty="0" smtClean="0"/>
-                <a:t>A2</a:t>
-              </a:r>
-              <a:endParaRPr lang="fr-FR" dirty="0"/>
-            </a:p>
-          </p:txBody>
-        </p:sp>
-        <p:sp>
-          <p:nvSpPr>
-            <p:cNvPr id="61" name="CaixaDeTexto 60"/>
-            <p:cNvSpPr txBox="1"/>
-            <p:nvPr/>
-          </p:nvSpPr>
-          <p:spPr>
-            <a:xfrm>
-              <a:off x="9017221" y="4606522"/>
-              <a:ext cx="434734" cy="369332"/>
-            </a:xfrm>
-            <a:prstGeom prst="rect">
-              <a:avLst/>
-            </a:prstGeom>
-            <a:noFill/>
-          </p:spPr>
-          <p:txBody>
-            <a:bodyPr wrap="none" rtlCol="0">
-              <a:spAutoFit/>
-            </a:bodyPr>
-            <a:lstStyle/>
-            <a:p>
-              <a:r>
-                <a:rPr lang="fr-FR" dirty="0" smtClean="0"/>
-                <a:t>A3</a:t>
-              </a:r>
-              <a:endParaRPr lang="fr-FR" dirty="0"/>
+              <a:pPr algn="ctr"/>
+              <a:endParaRPr lang="fr-FR"/>
             </a:p>
           </p:txBody>
         </p:sp>
       </p:grpSp>
+      <p:cxnSp>
+        <p:nvCxnSpPr>
+          <p:cNvPr id="49" name="Conector reto 48"/>
+          <p:cNvCxnSpPr/>
+          <p:nvPr/>
+        </p:nvCxnSpPr>
+        <p:spPr>
+          <a:xfrm flipV="1">
+            <a:off x="8520672" y="2842343"/>
+            <a:ext cx="882822" cy="665280"/>
+          </a:xfrm>
+          <a:prstGeom prst="line">
+            <a:avLst/>
+          </a:prstGeom>
+          <a:ln w="9525">
+            <a:solidFill>
+              <a:srgbClr val="FF0000"/>
+            </a:solidFill>
+          </a:ln>
+        </p:spPr>
+        <p:style>
+          <a:lnRef idx="1">
+            <a:schemeClr val="accent1"/>
+          </a:lnRef>
+          <a:fillRef idx="0">
+            <a:schemeClr val="accent1"/>
+          </a:fillRef>
+          <a:effectRef idx="0">
+            <a:schemeClr val="accent1"/>
+          </a:effectRef>
+          <a:fontRef idx="minor">
+            <a:schemeClr val="tx1"/>
+          </a:fontRef>
+        </p:style>
+      </p:cxnSp>
+      <p:cxnSp>
+        <p:nvCxnSpPr>
+          <p:cNvPr id="50" name="Conector reto 49"/>
+          <p:cNvCxnSpPr/>
+          <p:nvPr/>
+        </p:nvCxnSpPr>
+        <p:spPr>
+          <a:xfrm flipV="1">
+            <a:off x="8570768" y="2908702"/>
+            <a:ext cx="1099302" cy="828418"/>
+          </a:xfrm>
+          <a:prstGeom prst="line">
+            <a:avLst/>
+          </a:prstGeom>
+          <a:ln w="9525">
+            <a:solidFill>
+              <a:srgbClr val="FF0000"/>
+            </a:solidFill>
+          </a:ln>
+        </p:spPr>
+        <p:style>
+          <a:lnRef idx="1">
+            <a:schemeClr val="accent1"/>
+          </a:lnRef>
+          <a:fillRef idx="0">
+            <a:schemeClr val="accent1"/>
+          </a:fillRef>
+          <a:effectRef idx="0">
+            <a:schemeClr val="accent1"/>
+          </a:effectRef>
+          <a:fontRef idx="minor">
+            <a:schemeClr val="tx1"/>
+          </a:fontRef>
+        </p:style>
+      </p:cxnSp>
+      <p:cxnSp>
+        <p:nvCxnSpPr>
+          <p:cNvPr id="51" name="Conector reto 50"/>
+          <p:cNvCxnSpPr/>
+          <p:nvPr/>
+        </p:nvCxnSpPr>
+        <p:spPr>
+          <a:xfrm flipV="1">
+            <a:off x="8687453" y="3030658"/>
+            <a:ext cx="1175417" cy="885774"/>
+          </a:xfrm>
+          <a:prstGeom prst="line">
+            <a:avLst/>
+          </a:prstGeom>
+          <a:ln w="9525">
+            <a:solidFill>
+              <a:srgbClr val="FF0000"/>
+            </a:solidFill>
+          </a:ln>
+        </p:spPr>
+        <p:style>
+          <a:lnRef idx="1">
+            <a:schemeClr val="accent1"/>
+          </a:lnRef>
+          <a:fillRef idx="0">
+            <a:schemeClr val="accent1"/>
+          </a:fillRef>
+          <a:effectRef idx="0">
+            <a:schemeClr val="accent1"/>
+          </a:effectRef>
+          <a:fontRef idx="minor">
+            <a:schemeClr val="tx1"/>
+          </a:fontRef>
+        </p:style>
+      </p:cxnSp>
+      <p:cxnSp>
+        <p:nvCxnSpPr>
+          <p:cNvPr id="53" name="Conector reto 52"/>
+          <p:cNvCxnSpPr>
+            <a:endCxn id="47" idx="6"/>
+          </p:cNvCxnSpPr>
+          <p:nvPr/>
+        </p:nvCxnSpPr>
+        <p:spPr>
+          <a:xfrm flipV="1">
+            <a:off x="8810955" y="3263230"/>
+            <a:ext cx="1087026" cy="840860"/>
+          </a:xfrm>
+          <a:prstGeom prst="line">
+            <a:avLst/>
+          </a:prstGeom>
+          <a:ln w="9525">
+            <a:solidFill>
+              <a:srgbClr val="FF0000"/>
+            </a:solidFill>
+          </a:ln>
+        </p:spPr>
+        <p:style>
+          <a:lnRef idx="1">
+            <a:schemeClr val="accent1"/>
+          </a:lnRef>
+          <a:fillRef idx="0">
+            <a:schemeClr val="accent1"/>
+          </a:fillRef>
+          <a:effectRef idx="0">
+            <a:schemeClr val="accent1"/>
+          </a:effectRef>
+          <a:fontRef idx="minor">
+            <a:schemeClr val="tx1"/>
+          </a:fontRef>
+        </p:style>
+      </p:cxnSp>
+      <p:cxnSp>
+        <p:nvCxnSpPr>
+          <p:cNvPr id="56" name="Conector reto 55"/>
+          <p:cNvCxnSpPr/>
+          <p:nvPr/>
+        </p:nvCxnSpPr>
+        <p:spPr>
+          <a:xfrm flipV="1">
+            <a:off x="8498459" y="2842620"/>
+            <a:ext cx="519210" cy="391268"/>
+          </a:xfrm>
+          <a:prstGeom prst="line">
+            <a:avLst/>
+          </a:prstGeom>
+          <a:ln w="9525">
+            <a:solidFill>
+              <a:srgbClr val="FF0000"/>
+            </a:solidFill>
+          </a:ln>
+        </p:spPr>
+        <p:style>
+          <a:lnRef idx="1">
+            <a:schemeClr val="accent1"/>
+          </a:lnRef>
+          <a:fillRef idx="0">
+            <a:schemeClr val="accent1"/>
+          </a:fillRef>
+          <a:effectRef idx="0">
+            <a:schemeClr val="accent1"/>
+          </a:effectRef>
+          <a:fontRef idx="minor">
+            <a:schemeClr val="tx1"/>
+          </a:fontRef>
+        </p:style>
+      </p:cxnSp>
+      <p:sp>
+        <p:nvSpPr>
+          <p:cNvPr id="59" name="CaixaDeTexto 58"/>
+          <p:cNvSpPr txBox="1"/>
+          <p:nvPr/>
+        </p:nvSpPr>
+        <p:spPr>
+          <a:xfrm>
+            <a:off x="7907770" y="2831424"/>
+            <a:ext cx="434734" cy="369332"/>
+          </a:xfrm>
+          <a:prstGeom prst="rect">
+            <a:avLst/>
+          </a:prstGeom>
+          <a:noFill/>
+        </p:spPr>
+        <p:txBody>
+          <a:bodyPr wrap="none" rtlCol="0">
+            <a:spAutoFit/>
+          </a:bodyPr>
+          <a:lstStyle/>
+          <a:p>
+            <a:r>
+              <a:rPr lang="fr-FR" dirty="0" smtClean="0"/>
+              <a:t>A1</a:t>
+            </a:r>
+            <a:endParaRPr lang="fr-FR" dirty="0"/>
+          </a:p>
+        </p:txBody>
+      </p:sp>
+      <p:sp>
+        <p:nvSpPr>
+          <p:cNvPr id="60" name="CaixaDeTexto 59"/>
+          <p:cNvSpPr txBox="1"/>
+          <p:nvPr/>
+        </p:nvSpPr>
+        <p:spPr>
+          <a:xfrm>
+            <a:off x="10070123" y="2749655"/>
+            <a:ext cx="434734" cy="369332"/>
+          </a:xfrm>
+          <a:prstGeom prst="rect">
+            <a:avLst/>
+          </a:prstGeom>
+          <a:noFill/>
+        </p:spPr>
+        <p:txBody>
+          <a:bodyPr wrap="none" rtlCol="0">
+            <a:spAutoFit/>
+          </a:bodyPr>
+          <a:lstStyle/>
+          <a:p>
+            <a:r>
+              <a:rPr lang="fr-FR" dirty="0" smtClean="0"/>
+              <a:t>A2</a:t>
+            </a:r>
+            <a:endParaRPr lang="fr-FR" dirty="0"/>
+          </a:p>
+        </p:txBody>
+      </p:sp>
+      <p:sp>
+        <p:nvSpPr>
+          <p:cNvPr id="61" name="CaixaDeTexto 60"/>
+          <p:cNvSpPr txBox="1"/>
+          <p:nvPr/>
+        </p:nvSpPr>
+        <p:spPr>
+          <a:xfrm>
+            <a:off x="8981127" y="4642638"/>
+            <a:ext cx="434734" cy="369332"/>
+          </a:xfrm>
+          <a:prstGeom prst="rect">
+            <a:avLst/>
+          </a:prstGeom>
+          <a:noFill/>
+        </p:spPr>
+        <p:txBody>
+          <a:bodyPr wrap="none" rtlCol="0">
+            <a:spAutoFit/>
+          </a:bodyPr>
+          <a:lstStyle/>
+          <a:p>
+            <a:r>
+              <a:rPr lang="fr-FR" dirty="0" smtClean="0"/>
+              <a:t>A3</a:t>
+            </a:r>
+            <a:endParaRPr lang="fr-FR" dirty="0"/>
+          </a:p>
+        </p:txBody>
+      </p:sp>
       <p:cxnSp>
         <p:nvCxnSpPr>
           <p:cNvPr id="32" name="Conector reto 31"/>

</xml_diff>